<commit_message>
Huffman code.Step 1: Heapsort has been finished.
</commit_message>
<xml_diff>
--- a/9_BinaryTree/4_HeapSort/调整大顶堆分步解析图-个人.pptx
+++ b/9_BinaryTree/4_HeapSort/调整大顶堆分步解析图-个人.pptx
@@ -259,7 +259,7 @@
           <a:p>
             <a:fld id="{77BD0F15-A104-4472-9204-6F095601BC4E}" type="datetimeFigureOut">
               <a:rPr lang="zh-CN" altLang="en-US" smtClean="0"/>
-              <a:t>2023/7/5</a:t>
+              <a:t>2023/10/25</a:t>
             </a:fld>
             <a:endParaRPr lang="zh-CN" altLang="en-US"/>
           </a:p>
@@ -457,7 +457,7 @@
           <a:p>
             <a:fld id="{77BD0F15-A104-4472-9204-6F095601BC4E}" type="datetimeFigureOut">
               <a:rPr lang="zh-CN" altLang="en-US" smtClean="0"/>
-              <a:t>2023/7/5</a:t>
+              <a:t>2023/10/25</a:t>
             </a:fld>
             <a:endParaRPr lang="zh-CN" altLang="en-US"/>
           </a:p>
@@ -665,7 +665,7 @@
           <a:p>
             <a:fld id="{77BD0F15-A104-4472-9204-6F095601BC4E}" type="datetimeFigureOut">
               <a:rPr lang="zh-CN" altLang="en-US" smtClean="0"/>
-              <a:t>2023/7/5</a:t>
+              <a:t>2023/10/25</a:t>
             </a:fld>
             <a:endParaRPr lang="zh-CN" altLang="en-US"/>
           </a:p>
@@ -863,7 +863,7 @@
           <a:p>
             <a:fld id="{77BD0F15-A104-4472-9204-6F095601BC4E}" type="datetimeFigureOut">
               <a:rPr lang="zh-CN" altLang="en-US" smtClean="0"/>
-              <a:t>2023/7/5</a:t>
+              <a:t>2023/10/25</a:t>
             </a:fld>
             <a:endParaRPr lang="zh-CN" altLang="en-US"/>
           </a:p>
@@ -1138,7 +1138,7 @@
           <a:p>
             <a:fld id="{77BD0F15-A104-4472-9204-6F095601BC4E}" type="datetimeFigureOut">
               <a:rPr lang="zh-CN" altLang="en-US" smtClean="0"/>
-              <a:t>2023/7/5</a:t>
+              <a:t>2023/10/25</a:t>
             </a:fld>
             <a:endParaRPr lang="zh-CN" altLang="en-US"/>
           </a:p>
@@ -1403,7 +1403,7 @@
           <a:p>
             <a:fld id="{77BD0F15-A104-4472-9204-6F095601BC4E}" type="datetimeFigureOut">
               <a:rPr lang="zh-CN" altLang="en-US" smtClean="0"/>
-              <a:t>2023/7/5</a:t>
+              <a:t>2023/10/25</a:t>
             </a:fld>
             <a:endParaRPr lang="zh-CN" altLang="en-US"/>
           </a:p>
@@ -1815,7 +1815,7 @@
           <a:p>
             <a:fld id="{77BD0F15-A104-4472-9204-6F095601BC4E}" type="datetimeFigureOut">
               <a:rPr lang="zh-CN" altLang="en-US" smtClean="0"/>
-              <a:t>2023/7/5</a:t>
+              <a:t>2023/10/25</a:t>
             </a:fld>
             <a:endParaRPr lang="zh-CN" altLang="en-US"/>
           </a:p>
@@ -1956,7 +1956,7 @@
           <a:p>
             <a:fld id="{77BD0F15-A104-4472-9204-6F095601BC4E}" type="datetimeFigureOut">
               <a:rPr lang="zh-CN" altLang="en-US" smtClean="0"/>
-              <a:t>2023/7/5</a:t>
+              <a:t>2023/10/25</a:t>
             </a:fld>
             <a:endParaRPr lang="zh-CN" altLang="en-US"/>
           </a:p>
@@ -2069,7 +2069,7 @@
           <a:p>
             <a:fld id="{77BD0F15-A104-4472-9204-6F095601BC4E}" type="datetimeFigureOut">
               <a:rPr lang="zh-CN" altLang="en-US" smtClean="0"/>
-              <a:t>2023/7/5</a:t>
+              <a:t>2023/10/25</a:t>
             </a:fld>
             <a:endParaRPr lang="zh-CN" altLang="en-US"/>
           </a:p>
@@ -2380,7 +2380,7 @@
           <a:p>
             <a:fld id="{77BD0F15-A104-4472-9204-6F095601BC4E}" type="datetimeFigureOut">
               <a:rPr lang="zh-CN" altLang="en-US" smtClean="0"/>
-              <a:t>2023/7/5</a:t>
+              <a:t>2023/10/25</a:t>
             </a:fld>
             <a:endParaRPr lang="zh-CN" altLang="en-US"/>
           </a:p>
@@ -2668,7 +2668,7 @@
           <a:p>
             <a:fld id="{77BD0F15-A104-4472-9204-6F095601BC4E}" type="datetimeFigureOut">
               <a:rPr lang="zh-CN" altLang="en-US" smtClean="0"/>
-              <a:t>2023/7/5</a:t>
+              <a:t>2023/10/25</a:t>
             </a:fld>
             <a:endParaRPr lang="zh-CN" altLang="en-US"/>
           </a:p>
@@ -2909,7 +2909,7 @@
           <a:p>
             <a:fld id="{77BD0F15-A104-4472-9204-6F095601BC4E}" type="datetimeFigureOut">
               <a:rPr lang="zh-CN" altLang="en-US" smtClean="0"/>
-              <a:t>2023/7/5</a:t>
+              <a:t>2023/10/25</a:t>
             </a:fld>
             <a:endParaRPr lang="zh-CN" altLang="en-US"/>
           </a:p>
@@ -4243,7 +4243,23 @@
             </a:r>
             <a:r>
               <a:rPr lang="zh-CN" altLang="en-US" sz="1100" dirty="0"/>
-              <a:t>，得出最后一个中间节点下标是</a:t>
+              <a:t>，</a:t>
+            </a:r>
+            <a:r>
+              <a:rPr lang="en-US" altLang="zh-CN" sz="1100" dirty="0"/>
+              <a:t> n </a:t>
+            </a:r>
+            <a:r>
+              <a:rPr lang="zh-CN" altLang="en-US" sz="1100" dirty="0"/>
+              <a:t>是最后一个下标</a:t>
+            </a:r>
+            <a:r>
+              <a:rPr lang="en-US" altLang="zh-CN" sz="1100" dirty="0"/>
+              <a:t>7</a:t>
+            </a:r>
+            <a:r>
+              <a:rPr lang="zh-CN" altLang="en-US" sz="1100" dirty="0"/>
+              <a:t>，结果取整。得出最后一个中间节点下标是</a:t>
             </a:r>
             <a:r>
               <a:rPr lang="en-US" altLang="zh-CN" sz="1100" dirty="0"/>
@@ -4259,23 +4275,7 @@
             </a:r>
             <a:r>
               <a:rPr lang="zh-CN" altLang="en-US" sz="1100" dirty="0"/>
-              <a:t>，</a:t>
-            </a:r>
-            <a:r>
-              <a:rPr lang="en-US" altLang="zh-CN" sz="1100" dirty="0"/>
-              <a:t>n </a:t>
-            </a:r>
-            <a:r>
-              <a:rPr lang="zh-CN" altLang="en-US" sz="1100" dirty="0"/>
-              <a:t>是最后一个下标</a:t>
-            </a:r>
-            <a:r>
-              <a:rPr lang="en-US" altLang="zh-CN" sz="1100" dirty="0"/>
-              <a:t>7</a:t>
-            </a:r>
-            <a:r>
-              <a:rPr lang="zh-CN" altLang="en-US" sz="1100" dirty="0"/>
-              <a:t>，结果取整。</a:t>
+              <a:t>，。</a:t>
             </a:r>
           </a:p>
         </p:txBody>
@@ -5996,7 +5996,7 @@
         <p:spPr>
           <a:xfrm>
             <a:off x="8310203" y="3244123"/>
-            <a:ext cx="4114801" cy="600164"/>
+            <a:ext cx="4114801" cy="769441"/>
           </a:xfrm>
           <a:prstGeom prst="rect">
             <a:avLst/>
@@ -6011,7 +6011,7 @@
           <a:p>
             <a:r>
               <a:rPr lang="zh-CN" altLang="en-US" sz="1100" dirty="0"/>
-              <a:t>第二次调整，</a:t>
+              <a:t>第二次，调整倒数第二各中间节点：</a:t>
             </a:r>
             <a:r>
               <a:rPr lang="en-US" altLang="zh-CN" sz="1100" dirty="0"/>
@@ -6019,7 +6019,7 @@
             </a:r>
             <a:r>
               <a:rPr lang="zh-CN" altLang="en-US" sz="1100" dirty="0"/>
-              <a:t>放到父节点。注意，程序中首先把，如果右节点大的话，则把下标指向右节点，让右节点和父节点比较，而左右节点不必交换的，只是保证父节点最大即可。</a:t>
+              <a:t>放到父节点。注意，程序中首先比较左右节点，如果右节点大的话，则把下标指向右节点，让右节点和父节点比较，而左右节点不必交换的，只是保证父节点最大即可。</a:t>
             </a:r>
           </a:p>
         </p:txBody>

</xml_diff>